<commit_message>
Notebook fichero musica y actualizacion url repositorio en ppt
</commit_message>
<xml_diff>
--- a/Ejercicio.Final.2.pptx
+++ b/Ejercicio.Final.2.pptx
@@ -1209,7 +1209,7 @@
           <a:p>
             <a:fld id="{3D660895-80A2-4CF0-AE25-87E3BBFAC565}" type="datetimeFigureOut">
               <a:rPr lang="es-ES" smtClean="0"/>
-              <a:t>31/01/2022</a:t>
+              <a:t>01/02/2022</a:t>
             </a:fld>
             <a:endParaRPr lang="es-ES"/>
           </a:p>
@@ -1626,7 +1626,7 @@
           <a:p>
             <a:fld id="{F63EC4D7-51C1-44D8-BC75-B785898DBBCB}" type="datetime1">
               <a:rPr lang="es-ES" smtClean="0"/>
-              <a:t>31/01/2022</a:t>
+              <a:t>01/02/2022</a:t>
             </a:fld>
             <a:endParaRPr lang="es-ES"/>
           </a:p>
@@ -1826,7 +1826,7 @@
           <a:p>
             <a:fld id="{0FBC9595-757D-4548-A335-737B211636B6}" type="datetime1">
               <a:rPr lang="es-ES" smtClean="0"/>
-              <a:t>31/01/2022</a:t>
+              <a:t>01/02/2022</a:t>
             </a:fld>
             <a:endParaRPr lang="es-ES"/>
           </a:p>
@@ -2036,7 +2036,7 @@
           <a:p>
             <a:fld id="{1763F309-8657-4C50-B5B3-43B3F730473A}" type="datetime1">
               <a:rPr lang="es-ES" smtClean="0"/>
-              <a:t>31/01/2022</a:t>
+              <a:t>01/02/2022</a:t>
             </a:fld>
             <a:endParaRPr lang="es-ES"/>
           </a:p>
@@ -2236,7 +2236,7 @@
           <a:p>
             <a:fld id="{6FB07BF9-5D30-4005-81DE-F84B2F767CA8}" type="datetime1">
               <a:rPr lang="es-ES" smtClean="0"/>
-              <a:t>31/01/2022</a:t>
+              <a:t>01/02/2022</a:t>
             </a:fld>
             <a:endParaRPr lang="es-ES"/>
           </a:p>
@@ -2512,7 +2512,7 @@
           <a:p>
             <a:fld id="{A75769CA-516B-4D17-AAC6-A18316FEEA63}" type="datetime1">
               <a:rPr lang="es-ES" smtClean="0"/>
-              <a:t>31/01/2022</a:t>
+              <a:t>01/02/2022</a:t>
             </a:fld>
             <a:endParaRPr lang="es-ES"/>
           </a:p>
@@ -2780,7 +2780,7 @@
           <a:p>
             <a:fld id="{B9046A12-EBB1-460D-8449-A9AF2764C918}" type="datetime1">
               <a:rPr lang="es-ES" smtClean="0"/>
-              <a:t>31/01/2022</a:t>
+              <a:t>01/02/2022</a:t>
             </a:fld>
             <a:endParaRPr lang="es-ES"/>
           </a:p>
@@ -3195,7 +3195,7 @@
           <a:p>
             <a:fld id="{408A0F20-78B1-4649-8336-7DB9A53392C5}" type="datetime1">
               <a:rPr lang="es-ES" smtClean="0"/>
-              <a:t>31/01/2022</a:t>
+              <a:t>01/02/2022</a:t>
             </a:fld>
             <a:endParaRPr lang="es-ES"/>
           </a:p>
@@ -3337,7 +3337,7 @@
           <a:p>
             <a:fld id="{85243E0D-BED6-4EA6-A368-475F2C34CCB2}" type="datetime1">
               <a:rPr lang="es-ES" smtClean="0"/>
-              <a:t>31/01/2022</a:t>
+              <a:t>01/02/2022</a:t>
             </a:fld>
             <a:endParaRPr lang="es-ES"/>
           </a:p>
@@ -3450,7 +3450,7 @@
           <a:p>
             <a:fld id="{08339CD9-863A-41AA-B4C9-D81B4CD3F64F}" type="datetime1">
               <a:rPr lang="es-ES" smtClean="0"/>
-              <a:t>31/01/2022</a:t>
+              <a:t>01/02/2022</a:t>
             </a:fld>
             <a:endParaRPr lang="es-ES"/>
           </a:p>
@@ -3763,7 +3763,7 @@
           <a:p>
             <a:fld id="{1493E8BF-4756-47AF-9A88-94D595AE3488}" type="datetime1">
               <a:rPr lang="es-ES" smtClean="0"/>
-              <a:t>31/01/2022</a:t>
+              <a:t>01/02/2022</a:t>
             </a:fld>
             <a:endParaRPr lang="es-ES"/>
           </a:p>
@@ -4052,7 +4052,7 @@
           <a:p>
             <a:fld id="{5CA70628-62E8-4174-8852-42D699C45F85}" type="datetime1">
               <a:rPr lang="es-ES" smtClean="0"/>
-              <a:t>31/01/2022</a:t>
+              <a:t>01/02/2022</a:t>
             </a:fld>
             <a:endParaRPr lang="es-ES"/>
           </a:p>
@@ -4295,7 +4295,7 @@
           <a:p>
             <a:fld id="{75E600B4-F965-4CD2-86E5-BCD711944A8F}" type="datetime1">
               <a:rPr lang="es-ES" smtClean="0"/>
-              <a:t>31/01/2022</a:t>
+              <a:t>01/02/2022</a:t>
             </a:fld>
             <a:endParaRPr lang="es-ES"/>
           </a:p>
@@ -5157,26 +5157,8 @@
                 </a:solidFill>
                 <a:latin typeface="Calibri" panose="020F0502020204030204" pitchFamily="34" charset="0"/>
               </a:rPr>
-              <a:t>Repositorio: </a:t>
-            </a:r>
-            <a:r>
-              <a:rPr lang="es-ES_tradnl" sz="1600" dirty="0">
-                <a:solidFill>
-                  <a:schemeClr val="bg2">
-                    <a:lumMod val="25000"/>
-                  </a:schemeClr>
-                </a:solidFill>
-                <a:hlinkClick r:id="rId2"/>
-              </a:rPr>
-              <a:t>https://innersource.accenture.com/users/o.garcia.gonzalez/repos/mp2021_olaya_senor_garcia/browse</a:t>
-            </a:r>
-            <a:endParaRPr lang="es-ES_tradnl" sz="1600" dirty="0">
-              <a:solidFill>
-                <a:schemeClr val="bg2">
-                  <a:lumMod val="25000"/>
-                </a:schemeClr>
-              </a:solidFill>
-            </a:endParaRPr>
+              <a:t>Repositorio: https://github.com/luismiguelsenor/Grupo1.git</a:t>
+            </a:r>
           </a:p>
           <a:p>
             <a:endParaRPr lang="es-ES" sz="1600" dirty="0">
@@ -5233,7 +5215,7 @@
           <p:nvPr/>
         </p:nvPicPr>
         <p:blipFill>
-          <a:blip r:embed="rId3">
+          <a:blip r:embed="rId2">
             <a:alphaModFix amt="21000"/>
             <a:extLst>
               <a:ext uri="{28A0092B-C50C-407E-A947-70E740481C1C}">
@@ -11019,14 +11001,14 @@
           <p:nvPr>
             <p:extLst>
               <p:ext uri="{D42A27DB-BD31-4B8C-83A1-F6EECF244321}">
-                <p14:modId xmlns:p14="http://schemas.microsoft.com/office/powerpoint/2010/main" val="3474472706"/>
+                <p14:modId xmlns:p14="http://schemas.microsoft.com/office/powerpoint/2010/main" val="1510003604"/>
               </p:ext>
             </p:extLst>
           </p:nvPr>
         </p:nvGraphicFramePr>
         <p:xfrm>
-          <a:off x="838200" y="2028190"/>
-          <a:ext cx="10515600" cy="3850640"/>
+          <a:off x="722811" y="1503680"/>
+          <a:ext cx="10517778" cy="3840856"/>
         </p:xfrm>
         <a:graphic>
           <a:graphicData uri="http://schemas.openxmlformats.org/drawingml/2006/table">
@@ -11035,7 +11017,7 @@
                 <a:tableStyleId>{5C22544A-7EE6-4342-B048-85BDC9FD1C3A}</a:tableStyleId>
               </a:tblPr>
               <a:tblGrid>
-                <a:gridCol w="5257800">
+                <a:gridCol w="5259978">
                   <a:extLst>
                     <a:ext uri="{9D8B030D-6E8A-4147-A177-3AD203B41FA5}">
                       <a16:colId xmlns:a16="http://schemas.microsoft.com/office/drawing/2014/main" val="800550014"/>
@@ -11050,7 +11032,7 @@
                   </a:extLst>
                 </a:gridCol>
               </a:tblGrid>
-              <a:tr h="370840">
+              <a:tr h="365948">
                 <a:tc>
                   <a:txBody>
                     <a:bodyPr/>
@@ -11087,7 +11069,7 @@
                   </a:ext>
                 </a:extLst>
               </a:tr>
-              <a:tr h="370840">
+              <a:tr h="1173038">
                 <a:tc>
                   <a:txBody>
                     <a:bodyPr/>
@@ -11269,7 +11251,7 @@
                   </a:ext>
                 </a:extLst>
               </a:tr>
-              <a:tr h="370840">
+              <a:tr h="631635">
                 <a:tc>
                   <a:txBody>
                     <a:bodyPr/>
@@ -11330,7 +11312,7 @@
                   </a:ext>
                 </a:extLst>
               </a:tr>
-              <a:tr h="370840">
+              <a:tr h="365948">
                 <a:tc>
                   <a:txBody>
                     <a:bodyPr/>
@@ -11365,7 +11347,7 @@
                   </a:ext>
                 </a:extLst>
               </a:tr>
-              <a:tr h="370840">
+              <a:tr h="631635">
                 <a:tc>
                   <a:txBody>
                     <a:bodyPr/>
@@ -11408,7 +11390,7 @@
                   </a:ext>
                 </a:extLst>
               </a:tr>
-              <a:tr h="370840">
+              <a:tr h="631635">
                 <a:tc>
                   <a:txBody>
                     <a:bodyPr/>
@@ -14063,12 +14045,6 @@
 </file>
 
 <file path=customXml/item2.xml><?xml version="1.0" encoding="utf-8"?>
-<p:properties xmlns:p="http://schemas.microsoft.com/office/2006/metadata/properties" xmlns:xsi="http://www.w3.org/2001/XMLSchema-instance" xmlns:pc="http://schemas.microsoft.com/office/infopath/2007/PartnerControls">
-  <documentManagement/>
-</p:properties>
-</file>
-
-<file path=customXml/item3.xml><?xml version="1.0" encoding="utf-8"?>
 <ct:contentTypeSchema xmlns:ct="http://schemas.microsoft.com/office/2006/metadata/contentType" xmlns:ma="http://schemas.microsoft.com/office/2006/metadata/properties/metaAttributes" ct:_="" ma:_="" ma:contentTypeName="Document" ma:contentTypeID="0x01010013949388E696B949ABABABB062C96E3E" ma:contentTypeVersion="9" ma:contentTypeDescription="Create a new document." ma:contentTypeScope="" ma:versionID="0f5103440298d28615ef073e23991a50">
   <xsd:schema xmlns:xsd="http://www.w3.org/2001/XMLSchema" xmlns:xs="http://www.w3.org/2001/XMLSchema" xmlns:p="http://schemas.microsoft.com/office/2006/metadata/properties" xmlns:ns3="7cc876c5-f1c2-48c2-97b5-a8c4202b42c8" xmlns:ns4="dc4329f7-16b3-4ba8-bee3-5bd637303f8b" targetNamespace="http://schemas.microsoft.com/office/2006/metadata/properties" ma:root="true" ma:fieldsID="4e8df7345499ddcb180f144db6dd7d92" ns3:_="" ns4:_="">
     <xsd:import namespace="7cc876c5-f1c2-48c2-97b5-a8c4202b42c8"/>
@@ -14265,6 +14241,12 @@
 </ct:contentTypeSchema>
 </file>
 
+<file path=customXml/item3.xml><?xml version="1.0" encoding="utf-8"?>
+<p:properties xmlns:p="http://schemas.microsoft.com/office/2006/metadata/properties" xmlns:xsi="http://www.w3.org/2001/XMLSchema-instance" xmlns:pc="http://schemas.microsoft.com/office/infopath/2007/PartnerControls">
+  <documentManagement/>
+</p:properties>
+</file>
+
 <file path=customXml/itemProps1.xml><?xml version="1.0" encoding="utf-8"?>
 <ds:datastoreItem xmlns:ds="http://schemas.openxmlformats.org/officeDocument/2006/customXml" ds:itemID="{D881361F-9B87-475C-A189-FD9C6D04BDC8}">
   <ds:schemaRefs>
@@ -14274,23 +14256,6 @@
 </file>
 
 <file path=customXml/itemProps2.xml><?xml version="1.0" encoding="utf-8"?>
-<ds:datastoreItem xmlns:ds="http://schemas.openxmlformats.org/officeDocument/2006/customXml" ds:itemID="{0D4C7996-BAF2-4B93-ACED-233E08525FE9}">
-  <ds:schemaRefs>
-    <ds:schemaRef ds:uri="7cc876c5-f1c2-48c2-97b5-a8c4202b42c8"/>
-    <ds:schemaRef ds:uri="http://schemas.microsoft.com/office/2006/documentManagement/types"/>
-    <ds:schemaRef ds:uri="http://purl.org/dc/elements/1.1/"/>
-    <ds:schemaRef ds:uri="http://purl.org/dc/dcmitype/"/>
-    <ds:schemaRef ds:uri="http://www.w3.org/XML/1998/namespace"/>
-    <ds:schemaRef ds:uri="http://schemas.microsoft.com/office/2006/metadata/properties"/>
-    <ds:schemaRef ds:uri="http://purl.org/dc/terms/"/>
-    <ds:schemaRef ds:uri="http://schemas.microsoft.com/office/infopath/2007/PartnerControls"/>
-    <ds:schemaRef ds:uri="http://schemas.openxmlformats.org/package/2006/metadata/core-properties"/>
-    <ds:schemaRef ds:uri="dc4329f7-16b3-4ba8-bee3-5bd637303f8b"/>
-  </ds:schemaRefs>
-</ds:datastoreItem>
-</file>
-
-<file path=customXml/itemProps3.xml><?xml version="1.0" encoding="utf-8"?>
 <ds:datastoreItem xmlns:ds="http://schemas.openxmlformats.org/officeDocument/2006/customXml" ds:itemID="{1AC07F1B-45C2-4ACA-8780-E39029AF41BB}">
   <ds:schemaRefs>
     <ds:schemaRef ds:uri="http://schemas.microsoft.com/office/2006/metadata/contentType"/>
@@ -14307,4 +14272,21 @@
     <ds:schemaRef ds:uri="http://schemas.microsoft.com/internal/obd"/>
   </ds:schemaRefs>
 </ds:datastoreItem>
+</file>
+
+<file path=customXml/itemProps3.xml><?xml version="1.0" encoding="utf-8"?>
+<ds:datastoreItem xmlns:ds="http://schemas.openxmlformats.org/officeDocument/2006/customXml" ds:itemID="{0D4C7996-BAF2-4B93-ACED-233E08525FE9}">
+  <ds:schemaRefs>
+    <ds:schemaRef ds:uri="7cc876c5-f1c2-48c2-97b5-a8c4202b42c8"/>
+    <ds:schemaRef ds:uri="http://schemas.microsoft.com/office/2006/documentManagement/types"/>
+    <ds:schemaRef ds:uri="http://purl.org/dc/elements/1.1/"/>
+    <ds:schemaRef ds:uri="http://purl.org/dc/dcmitype/"/>
+    <ds:schemaRef ds:uri="http://www.w3.org/XML/1998/namespace"/>
+    <ds:schemaRef ds:uri="http://schemas.microsoft.com/office/2006/metadata/properties"/>
+    <ds:schemaRef ds:uri="http://purl.org/dc/terms/"/>
+    <ds:schemaRef ds:uri="http://schemas.microsoft.com/office/infopath/2007/PartnerControls"/>
+    <ds:schemaRef ds:uri="http://schemas.openxmlformats.org/package/2006/metadata/core-properties"/>
+    <ds:schemaRef ds:uri="dc4329f7-16b3-4ba8-bee3-5bd637303f8b"/>
+  </ds:schemaRefs>
+</ds:datastoreItem>
 </file>
</xml_diff>